<commit_message>
Updates to .net 5
</commit_message>
<xml_diff>
--- a/DistributedTracing/DistributedTracing.pptx
+++ b/DistributedTracing/DistributedTracing.pptx
@@ -212,7 +212,7 @@
           <a:p>
             <a:fld id="{BA11CBBD-FCCC-4341-9A07-9341F6C54581}" type="datetimeFigureOut">
               <a:rPr lang="en-US" smtClean="0"/>
-              <a:t>10/2/2020</a:t>
+              <a:t>12/15/2020</a:t>
             </a:fld>
             <a:endParaRPr lang="en-US"/>
           </a:p>
@@ -4834,16 +4834,13 @@
           <a:p>
             <a:r>
               <a:rPr lang="en-US" dirty="0"/>
-              <a:t>Activities for W3C </a:t>
-            </a:r>
-            <a:r>
-              <a:rPr lang="en-US" dirty="0" err="1"/>
-              <a:t>TraceContext</a:t>
-            </a:r>
-            <a:r>
-              <a:rPr lang="en-US" dirty="0"/>
-              <a:t> propagation</a:t>
-            </a:r>
+              <a:t>Activities for </a:t>
+            </a:r>
+            <a:r>
+              <a:rPr lang="en-US"/>
+              <a:t>W3C propagation</a:t>
+            </a:r>
+            <a:endParaRPr lang="en-US" dirty="0"/>
           </a:p>
           <a:p>
             <a:endParaRPr lang="en-US" dirty="0"/>
@@ -4855,8 +4852,13 @@
             </a:r>
             <a:r>
               <a:rPr lang="en-US" dirty="0"/>
-              <a:t> for Activity adapter</a:t>
-            </a:r>
+              <a:t> for </a:t>
+            </a:r>
+            <a:r>
+              <a:rPr lang="en-US" dirty="0" err="1"/>
+              <a:t>ActivityListener</a:t>
+            </a:r>
+            <a:endParaRPr lang="en-US" dirty="0"/>
           </a:p>
           <a:p>
             <a:endParaRPr lang="en-US" dirty="0"/>

</xml_diff>